<commit_message>
add lateral mark diagram
</commit_message>
<xml_diff>
--- a/DiagramArtwork.pptx
+++ b/DiagramArtwork.pptx
@@ -7,6 +7,7 @@
   <p:sldIdLst>
     <p:sldId id="256" r:id="rId2"/>
     <p:sldId id="257" r:id="rId3"/>
+    <p:sldId id="258" r:id="rId4"/>
   </p:sldIdLst>
   <p:sldSz cx="12192000" cy="6858000"/>
   <p:notesSz cx="6858000" cy="9144000"/>
@@ -6776,6 +6777,280 @@
 </p:sld>
 </file>
 
+<file path=ppt/slides/slide3.xml><?xml version="1.0" encoding="utf-8"?>
+<p:sld xmlns:a="http://schemas.openxmlformats.org/drawingml/2006/main" xmlns:r="http://schemas.openxmlformats.org/officeDocument/2006/relationships" xmlns:p="http://schemas.openxmlformats.org/presentationml/2006/main">
+  <p:cSld>
+    <p:spTree>
+      <p:nvGrpSpPr>
+        <p:cNvPr id="1" name=""/>
+        <p:cNvGrpSpPr/>
+        <p:nvPr/>
+      </p:nvGrpSpPr>
+      <p:grpSpPr>
+        <a:xfrm>
+          <a:off x="0" y="0"/>
+          <a:ext cx="0" cy="0"/>
+          <a:chOff x="0" y="0"/>
+          <a:chExt cx="0" cy="0"/>
+        </a:xfrm>
+      </p:grpSpPr>
+      <p:pic>
+        <p:nvPicPr>
+          <p:cNvPr id="3074" name="Picture 2">
+            <a:extLst>
+              <a:ext uri="{FF2B5EF4-FFF2-40B4-BE49-F238E27FC236}">
+                <a16:creationId xmlns:a16="http://schemas.microsoft.com/office/drawing/2014/main" id="{C247AE29-C93A-1748-B7D4-111C3EDD3BFD}"/>
+              </a:ext>
+            </a:extLst>
+          </p:cNvPr>
+          <p:cNvPicPr>
+            <a:picLocks noChangeAspect="1" noChangeArrowheads="1"/>
+          </p:cNvPicPr>
+          <p:nvPr/>
+        </p:nvPicPr>
+        <p:blipFill>
+          <a:blip r:embed="rId2">
+            <a:extLst>
+              <a:ext uri="{28A0092B-C50C-407E-A947-70E740481C1C}">
+                <a14:useLocalDpi xmlns:a14="http://schemas.microsoft.com/office/drawing/2010/main" val="0"/>
+              </a:ext>
+            </a:extLst>
+          </a:blip>
+          <a:srcRect/>
+          <a:stretch>
+            <a:fillRect/>
+          </a:stretch>
+        </p:blipFill>
+        <p:spPr bwMode="auto">
+          <a:xfrm>
+            <a:off x="1608293" y="1198657"/>
+            <a:ext cx="8975414" cy="1423520"/>
+          </a:xfrm>
+          <a:prstGeom prst="rect">
+            <a:avLst/>
+          </a:prstGeom>
+          <a:noFill/>
+          <a:extLst>
+            <a:ext uri="{909E8E84-426E-40DD-AFC4-6F175D3DCCD1}">
+              <a14:hiddenFill xmlns:a14="http://schemas.microsoft.com/office/drawing/2010/main">
+                <a:solidFill>
+                  <a:srgbClr val="FFFFFF"/>
+                </a:solidFill>
+              </a14:hiddenFill>
+            </a:ext>
+          </a:extLst>
+        </p:spPr>
+      </p:pic>
+      <p:sp>
+        <p:nvSpPr>
+          <p:cNvPr id="5" name="TextBox 4">
+            <a:extLst>
+              <a:ext uri="{FF2B5EF4-FFF2-40B4-BE49-F238E27FC236}">
+                <a16:creationId xmlns:a16="http://schemas.microsoft.com/office/drawing/2014/main" id="{85B74427-34F8-6B4D-844C-E92BC7760C2C}"/>
+              </a:ext>
+            </a:extLst>
+          </p:cNvPr>
+          <p:cNvSpPr txBox="1"/>
+          <p:nvPr/>
+        </p:nvSpPr>
+        <p:spPr>
+          <a:xfrm>
+            <a:off x="4347823" y="282637"/>
+            <a:ext cx="2904565" cy="523220"/>
+          </a:xfrm>
+          <a:prstGeom prst="rect">
+            <a:avLst/>
+          </a:prstGeom>
+          <a:noFill/>
+        </p:spPr>
+        <p:txBody>
+          <a:bodyPr wrap="square" rtlCol="0">
+            <a:spAutoFit/>
+          </a:bodyPr>
+          <a:lstStyle/>
+          <a:p>
+            <a:r>
+              <a:rPr lang="en-US" sz="2800" dirty="0"/>
+              <a:t>Return to Harbour </a:t>
+            </a:r>
+          </a:p>
+        </p:txBody>
+      </p:sp>
+      <p:cxnSp>
+        <p:nvCxnSpPr>
+          <p:cNvPr id="6" name="Straight Connector 5">
+            <a:extLst>
+              <a:ext uri="{FF2B5EF4-FFF2-40B4-BE49-F238E27FC236}">
+                <a16:creationId xmlns:a16="http://schemas.microsoft.com/office/drawing/2014/main" id="{F0223C75-EDAD-244E-9207-B47F38E43B97}"/>
+              </a:ext>
+            </a:extLst>
+          </p:cNvPr>
+          <p:cNvCxnSpPr>
+            <a:cxnSpLocks/>
+          </p:cNvCxnSpPr>
+          <p:nvPr/>
+        </p:nvCxnSpPr>
+        <p:spPr>
+          <a:xfrm flipV="1">
+            <a:off x="5800106" y="805857"/>
+            <a:ext cx="0" cy="5110849"/>
+          </a:xfrm>
+          <a:prstGeom prst="line">
+            <a:avLst/>
+          </a:prstGeom>
+          <a:ln w="60325">
+            <a:tailEnd type="triangle" w="lg" len="lg"/>
+          </a:ln>
+        </p:spPr>
+        <p:style>
+          <a:lnRef idx="1">
+            <a:schemeClr val="accent1"/>
+          </a:lnRef>
+          <a:fillRef idx="0">
+            <a:schemeClr val="accent1"/>
+          </a:fillRef>
+          <a:effectRef idx="0">
+            <a:schemeClr val="accent1"/>
+          </a:effectRef>
+          <a:fontRef idx="minor">
+            <a:schemeClr val="tx1"/>
+          </a:fontRef>
+        </p:style>
+      </p:cxnSp>
+      <p:sp>
+        <p:nvSpPr>
+          <p:cNvPr id="8" name="TextBox 7">
+            <a:extLst>
+              <a:ext uri="{FF2B5EF4-FFF2-40B4-BE49-F238E27FC236}">
+                <a16:creationId xmlns:a16="http://schemas.microsoft.com/office/drawing/2014/main" id="{DD97A533-89EF-034E-94C9-872CD00959AF}"/>
+              </a:ext>
+            </a:extLst>
+          </p:cNvPr>
+          <p:cNvSpPr txBox="1"/>
+          <p:nvPr/>
+        </p:nvSpPr>
+        <p:spPr>
+          <a:xfrm>
+            <a:off x="5163580" y="1769830"/>
+            <a:ext cx="1273049" cy="523220"/>
+          </a:xfrm>
+          <a:prstGeom prst="rect">
+            <a:avLst/>
+          </a:prstGeom>
+          <a:solidFill>
+            <a:schemeClr val="bg1"/>
+          </a:solidFill>
+        </p:spPr>
+        <p:txBody>
+          <a:bodyPr wrap="square" rtlCol="0">
+            <a:spAutoFit/>
+          </a:bodyPr>
+          <a:lstStyle/>
+          <a:p>
+            <a:r>
+              <a:rPr lang="en-US" sz="2800" b="1" dirty="0"/>
+              <a:t>IALA: A</a:t>
+            </a:r>
+          </a:p>
+        </p:txBody>
+      </p:sp>
+      <p:pic>
+        <p:nvPicPr>
+          <p:cNvPr id="3076" name="Picture 4">
+            <a:extLst>
+              <a:ext uri="{FF2B5EF4-FFF2-40B4-BE49-F238E27FC236}">
+                <a16:creationId xmlns:a16="http://schemas.microsoft.com/office/drawing/2014/main" id="{B35791A6-8E61-294C-AD92-10114A8C115F}"/>
+              </a:ext>
+            </a:extLst>
+          </p:cNvPr>
+          <p:cNvPicPr>
+            <a:picLocks noChangeAspect="1" noChangeArrowheads="1"/>
+          </p:cNvPicPr>
+          <p:nvPr/>
+        </p:nvPicPr>
+        <p:blipFill>
+          <a:blip r:embed="rId3">
+            <a:extLst>
+              <a:ext uri="{28A0092B-C50C-407E-A947-70E740481C1C}">
+                <a14:useLocalDpi xmlns:a14="http://schemas.microsoft.com/office/drawing/2010/main" val="0"/>
+              </a:ext>
+            </a:extLst>
+          </a:blip>
+          <a:srcRect/>
+          <a:stretch>
+            <a:fillRect/>
+          </a:stretch>
+        </p:blipFill>
+        <p:spPr bwMode="auto">
+          <a:xfrm>
+            <a:off x="1506077" y="3740150"/>
+            <a:ext cx="9079026" cy="1800038"/>
+          </a:xfrm>
+          <a:prstGeom prst="rect">
+            <a:avLst/>
+          </a:prstGeom>
+          <a:noFill/>
+          <a:extLst>
+            <a:ext uri="{909E8E84-426E-40DD-AFC4-6F175D3DCCD1}">
+              <a14:hiddenFill xmlns:a14="http://schemas.microsoft.com/office/drawing/2010/main">
+                <a:solidFill>
+                  <a:srgbClr val="FFFFFF"/>
+                </a:solidFill>
+              </a14:hiddenFill>
+            </a:ext>
+          </a:extLst>
+        </p:spPr>
+      </p:pic>
+      <p:sp>
+        <p:nvSpPr>
+          <p:cNvPr id="10" name="TextBox 9">
+            <a:extLst>
+              <a:ext uri="{FF2B5EF4-FFF2-40B4-BE49-F238E27FC236}">
+                <a16:creationId xmlns:a16="http://schemas.microsoft.com/office/drawing/2014/main" id="{C6409CF2-CEDA-7E4D-A78B-3C3C66096289}"/>
+              </a:ext>
+            </a:extLst>
+          </p:cNvPr>
+          <p:cNvSpPr txBox="1"/>
+          <p:nvPr/>
+        </p:nvSpPr>
+        <p:spPr>
+          <a:xfrm>
+            <a:off x="5087380" y="4638254"/>
+            <a:ext cx="1273049" cy="523220"/>
+          </a:xfrm>
+          <a:prstGeom prst="rect">
+            <a:avLst/>
+          </a:prstGeom>
+          <a:solidFill>
+            <a:schemeClr val="bg1"/>
+          </a:solidFill>
+        </p:spPr>
+        <p:txBody>
+          <a:bodyPr wrap="square" rtlCol="0">
+            <a:spAutoFit/>
+          </a:bodyPr>
+          <a:lstStyle/>
+          <a:p>
+            <a:r>
+              <a:rPr lang="en-US" sz="2800" b="1" dirty="0"/>
+              <a:t>IALA: B</a:t>
+            </a:r>
+          </a:p>
+        </p:txBody>
+      </p:sp>
+    </p:spTree>
+    <p:extLst>
+      <p:ext uri="{BB962C8B-B14F-4D97-AF65-F5344CB8AC3E}">
+        <p14:creationId xmlns:p14="http://schemas.microsoft.com/office/powerpoint/2010/main" val="1546779204"/>
+      </p:ext>
+    </p:extLst>
+  </p:cSld>
+  <p:clrMapOvr>
+    <a:masterClrMapping/>
+  </p:clrMapOvr>
+</p:sld>
+</file>
+
 <file path=ppt/theme/theme1.xml><?xml version="1.0" encoding="utf-8"?>
 <a:theme xmlns:a="http://schemas.openxmlformats.org/drawingml/2006/main" name="Office Theme">
   <a:themeElements>

</xml_diff>